<commit_message>
Actualización del Story Telling
</commit_message>
<xml_diff>
--- a/Story Telling.pptx
+++ b/Story Telling.pptx
@@ -6,9 +6,11 @@
   </p:sldMasterIdLst>
   <p:sldIdLst>
     <p:sldId id="256" r:id="rId2"/>
-    <p:sldId id="257" r:id="rId3"/>
-    <p:sldId id="258" r:id="rId4"/>
-    <p:sldId id="259" r:id="rId5"/>
+    <p:sldId id="260" r:id="rId3"/>
+    <p:sldId id="257" r:id="rId4"/>
+    <p:sldId id="258" r:id="rId5"/>
+    <p:sldId id="259" r:id="rId6"/>
+    <p:sldId id="261" r:id="rId7"/>
   </p:sldIdLst>
   <p:sldSz cx="12192000" cy="6858000"/>
   <p:notesSz cx="6858000" cy="9144000"/>
@@ -107,6 +109,11 @@
       </a:defRPr>
     </a:lvl9pPr>
   </p:defaultTextStyle>
+  <p:extLst>
+    <p:ext uri="{EFAFB233-063F-42B5-8137-9DF3F51BA10A}">
+      <p15:sldGuideLst xmlns:p15="http://schemas.microsoft.com/office/powerpoint/2012/main"/>
+    </p:ext>
+  </p:extLst>
 </p:presentation>
 </file>
 
@@ -253,7 +260,7 @@
           <a:p>
             <a:fld id="{2395C5C9-164C-46B3-A87E-7660D39D3106}" type="datetime2">
               <a:rPr lang="en-US" smtClean="0"/>
-              <a:t>Wednesday, July 26, 2023</a:t>
+              <a:t>Friday, July 28, 2023</a:t>
             </a:fld>
             <a:endParaRPr lang="en-US" dirty="0"/>
           </a:p>
@@ -456,7 +463,7 @@
           <a:p>
             <a:fld id="{5B75179A-1E2B-41AB-B400-4F1B4022FAEE}" type="datetime2">
               <a:rPr lang="en-US" smtClean="0"/>
-              <a:t>Wednesday, July 26, 2023</a:t>
+              <a:t>Friday, July 28, 2023</a:t>
             </a:fld>
             <a:endParaRPr lang="en-US"/>
           </a:p>
@@ -669,7 +676,7 @@
           <a:p>
             <a:fld id="{05681D0F-6595-4F14-8EF3-954CD87C797B}" type="datetime2">
               <a:rPr lang="en-US" smtClean="0"/>
-              <a:t>Wednesday, July 26, 2023</a:t>
+              <a:t>Friday, July 28, 2023</a:t>
             </a:fld>
             <a:endParaRPr lang="en-US"/>
           </a:p>
@@ -871,7 +878,7 @@
           <a:p>
             <a:fld id="{4DDCFF8A-AAF8-4A12-8A91-9CA0EAF6CBB9}" type="datetime2">
               <a:rPr lang="en-US" smtClean="0"/>
-              <a:t>Wednesday, July 26, 2023</a:t>
+              <a:t>Friday, July 28, 2023</a:t>
             </a:fld>
             <a:endParaRPr lang="en-US" dirty="0"/>
           </a:p>
@@ -1150,7 +1157,7 @@
           <a:p>
             <a:fld id="{ABCC25C3-021A-4B0B-8F70-0C181FE1CF45}" type="datetime2">
               <a:rPr lang="en-US" smtClean="0"/>
-              <a:t>Wednesday, July 26, 2023</a:t>
+              <a:t>Friday, July 28, 2023</a:t>
             </a:fld>
             <a:endParaRPr lang="en-US"/>
           </a:p>
@@ -1410,7 +1417,7 @@
           <a:p>
             <a:fld id="{0C23D88D-8CEC-4ED9-A53B-5596187D9A16}" type="datetime2">
               <a:rPr lang="en-US" smtClean="0"/>
-              <a:t>Wednesday, July 26, 2023</a:t>
+              <a:t>Friday, July 28, 2023</a:t>
             </a:fld>
             <a:endParaRPr lang="en-US"/>
           </a:p>
@@ -1826,7 +1833,7 @@
           <a:p>
             <a:fld id="{D2CCD382-DFDA-4722-A27A-59C21AD112F2}" type="datetime2">
               <a:rPr lang="en-US" smtClean="0"/>
-              <a:t>Wednesday, July 26, 2023</a:t>
+              <a:t>Friday, July 28, 2023</a:t>
             </a:fld>
             <a:endParaRPr lang="en-US"/>
           </a:p>
@@ -1971,7 +1978,7 @@
           <a:p>
             <a:fld id="{22F2A30D-1C09-413F-AAB1-38F366000715}" type="datetime2">
               <a:rPr lang="en-US" smtClean="0"/>
-              <a:t>Wednesday, July 26, 2023</a:t>
+              <a:t>Friday, July 28, 2023</a:t>
             </a:fld>
             <a:endParaRPr lang="en-US"/>
           </a:p>
@@ -2093,7 +2100,7 @@
           <a:p>
             <a:fld id="{6DB82B9C-D65E-4F64-95C3-B10F3B00F0D9}" type="datetime2">
               <a:rPr lang="en-US" smtClean="0"/>
-              <a:t>Wednesday, July 26, 2023</a:t>
+              <a:t>Friday, July 28, 2023</a:t>
             </a:fld>
             <a:endParaRPr lang="en-US"/>
           </a:p>
@@ -2416,7 +2423,7 @@
           <a:p>
             <a:fld id="{B7F5FDCC-6AAC-4A08-B9E0-3793AB5E64C3}" type="datetime2">
               <a:rPr lang="en-US" smtClean="0"/>
-              <a:t>Wednesday, July 26, 2023</a:t>
+              <a:t>Friday, July 28, 2023</a:t>
             </a:fld>
             <a:endParaRPr lang="en-US"/>
           </a:p>
@@ -2704,7 +2711,7 @@
           <a:p>
             <a:fld id="{349FE94D-439C-40F1-900E-BC07940E3988}" type="datetime2">
               <a:rPr lang="en-US" smtClean="0"/>
-              <a:t>Wednesday, July 26, 2023</a:t>
+              <a:t>Friday, July 28, 2023</a:t>
             </a:fld>
             <a:endParaRPr lang="en-US"/>
           </a:p>
@@ -2992,7 +2999,7 @@
           <a:p>
             <a:fld id="{8DEA2CF1-0EB2-4673-802D-3371233E4A77}" type="datetime2">
               <a:rPr lang="en-US" smtClean="0"/>
-              <a:t>Wednesday, July 26, 2023</a:t>
+              <a:t>Friday, July 28, 2023</a:t>
             </a:fld>
             <a:endParaRPr lang="en-US" dirty="0"/>
           </a:p>
@@ -3717,6 +3724,371 @@
           <p:cNvPr id="2" name="Título 1">
             <a:extLst>
               <a:ext uri="{FF2B5EF4-FFF2-40B4-BE49-F238E27FC236}">
+                <a16:creationId xmlns:a16="http://schemas.microsoft.com/office/drawing/2014/main" id="{28B2AA43-91D9-F809-BBF0-58B40BDDCBFA}"/>
+              </a:ext>
+            </a:extLst>
+          </p:cNvPr>
+          <p:cNvSpPr>
+            <a:spLocks noGrp="1"/>
+          </p:cNvSpPr>
+          <p:nvPr>
+            <p:ph type="title"/>
+          </p:nvPr>
+        </p:nvSpPr>
+        <p:spPr/>
+        <p:txBody>
+          <a:bodyPr/>
+          <a:lstStyle/>
+          <a:p>
+            <a:r>
+              <a:rPr lang="es-ES" dirty="0"/>
+              <a:t>Introducción del proyecto</a:t>
+            </a:r>
+          </a:p>
+        </p:txBody>
+      </p:sp>
+      <p:sp>
+        <p:nvSpPr>
+          <p:cNvPr id="4" name="Marcador de texto 3">
+            <a:extLst>
+              <a:ext uri="{FF2B5EF4-FFF2-40B4-BE49-F238E27FC236}">
+                <a16:creationId xmlns:a16="http://schemas.microsoft.com/office/drawing/2014/main" id="{C784EF0B-51F3-A71D-CED3-09A837C3438C}"/>
+              </a:ext>
+            </a:extLst>
+          </p:cNvPr>
+          <p:cNvSpPr>
+            <a:spLocks noGrp="1"/>
+          </p:cNvSpPr>
+          <p:nvPr>
+            <p:ph type="body" idx="1"/>
+          </p:nvPr>
+        </p:nvSpPr>
+        <p:spPr/>
+        <p:txBody>
+          <a:bodyPr/>
+          <a:lstStyle/>
+          <a:p>
+            <a:pPr algn="ctr"/>
+            <a:r>
+              <a:rPr lang="es-ES" dirty="0"/>
+              <a:t>Google </a:t>
+            </a:r>
+            <a:r>
+              <a:rPr lang="es-ES" dirty="0" err="1"/>
+              <a:t>Colab</a:t>
+            </a:r>
+            <a:endParaRPr lang="es-ES" dirty="0"/>
+          </a:p>
+        </p:txBody>
+      </p:sp>
+      <p:sp>
+        <p:nvSpPr>
+          <p:cNvPr id="3" name="Marcador de contenido 2">
+            <a:extLst>
+              <a:ext uri="{FF2B5EF4-FFF2-40B4-BE49-F238E27FC236}">
+                <a16:creationId xmlns:a16="http://schemas.microsoft.com/office/drawing/2014/main" id="{CCB8F7A0-0762-0C94-56A0-015C5A6AD811}"/>
+              </a:ext>
+            </a:extLst>
+          </p:cNvPr>
+          <p:cNvSpPr>
+            <a:spLocks noGrp="1"/>
+          </p:cNvSpPr>
+          <p:nvPr>
+            <p:ph sz="half" idx="2"/>
+          </p:nvPr>
+        </p:nvSpPr>
+        <p:spPr>
+          <a:xfrm>
+            <a:off x="720000" y="2541600"/>
+            <a:ext cx="5003801" cy="3697200"/>
+          </a:xfrm>
+        </p:spPr>
+        <p:txBody>
+          <a:bodyPr>
+            <a:normAutofit/>
+          </a:bodyPr>
+          <a:lstStyle/>
+          <a:p>
+            <a:endParaRPr lang="es-ES" dirty="0"/>
+          </a:p>
+          <a:p>
+            <a:endParaRPr lang="es-ES" dirty="0"/>
+          </a:p>
+          <a:p>
+            <a:endParaRPr lang="es-ES" dirty="0"/>
+          </a:p>
+          <a:p>
+            <a:endParaRPr lang="es-ES" dirty="0"/>
+          </a:p>
+          <a:p>
+            <a:r>
+              <a:rPr lang="es-ES" dirty="0"/>
+              <a:t>Utilice Google </a:t>
+            </a:r>
+            <a:r>
+              <a:rPr lang="es-ES" dirty="0" err="1"/>
+              <a:t>colab</a:t>
+            </a:r>
+            <a:r>
+              <a:rPr lang="es-ES" dirty="0"/>
+              <a:t>, para trabajar los códigos de Python, utilizando diversas librerías, como lo son </a:t>
+            </a:r>
+            <a:r>
+              <a:rPr lang="es-ES" dirty="0" err="1"/>
+              <a:t>matplot</a:t>
+            </a:r>
+            <a:r>
+              <a:rPr lang="es-ES" dirty="0"/>
+              <a:t>, </a:t>
+            </a:r>
+            <a:r>
+              <a:rPr lang="es-ES" dirty="0" err="1"/>
+              <a:t>nump</a:t>
+            </a:r>
+            <a:r>
+              <a:rPr lang="es-ES" dirty="0"/>
+              <a:t>, </a:t>
+            </a:r>
+            <a:r>
+              <a:rPr lang="es-ES" dirty="0" err="1"/>
+              <a:t>std</a:t>
+            </a:r>
+            <a:r>
+              <a:rPr lang="es-ES" dirty="0"/>
+              <a:t>, entre otras.</a:t>
+            </a:r>
+          </a:p>
+        </p:txBody>
+      </p:sp>
+      <p:sp>
+        <p:nvSpPr>
+          <p:cNvPr id="5" name="Marcador de texto 4">
+            <a:extLst>
+              <a:ext uri="{FF2B5EF4-FFF2-40B4-BE49-F238E27FC236}">
+                <a16:creationId xmlns:a16="http://schemas.microsoft.com/office/drawing/2014/main" id="{B59C86B6-6476-1AC8-0072-44E939AA5278}"/>
+              </a:ext>
+            </a:extLst>
+          </p:cNvPr>
+          <p:cNvSpPr>
+            <a:spLocks noGrp="1"/>
+          </p:cNvSpPr>
+          <p:nvPr>
+            <p:ph type="body" sz="quarter" idx="3"/>
+          </p:nvPr>
+        </p:nvSpPr>
+        <p:spPr/>
+        <p:txBody>
+          <a:bodyPr/>
+          <a:lstStyle/>
+          <a:p>
+            <a:pPr algn="ctr"/>
+            <a:r>
+              <a:rPr lang="es-ES" dirty="0"/>
+              <a:t>Bases de datos</a:t>
+            </a:r>
+          </a:p>
+        </p:txBody>
+      </p:sp>
+      <p:sp>
+        <p:nvSpPr>
+          <p:cNvPr id="6" name="Marcador de contenido 5">
+            <a:extLst>
+              <a:ext uri="{FF2B5EF4-FFF2-40B4-BE49-F238E27FC236}">
+                <a16:creationId xmlns:a16="http://schemas.microsoft.com/office/drawing/2014/main" id="{794DA481-42B9-8D5A-BD5A-3E84F3ECBF0F}"/>
+              </a:ext>
+            </a:extLst>
+          </p:cNvPr>
+          <p:cNvSpPr>
+            <a:spLocks noGrp="1"/>
+          </p:cNvSpPr>
+          <p:nvPr>
+            <p:ph sz="quarter" idx="4"/>
+          </p:nvPr>
+        </p:nvSpPr>
+        <p:spPr/>
+        <p:txBody>
+          <a:bodyPr>
+            <a:normAutofit/>
+          </a:bodyPr>
+          <a:lstStyle/>
+          <a:p>
+            <a:endParaRPr lang="es-ES" dirty="0"/>
+          </a:p>
+          <a:p>
+            <a:endParaRPr lang="es-ES" dirty="0"/>
+          </a:p>
+          <a:p>
+            <a:endParaRPr lang="es-ES" dirty="0"/>
+          </a:p>
+          <a:p>
+            <a:endParaRPr lang="es-ES" dirty="0"/>
+          </a:p>
+          <a:p>
+            <a:r>
+              <a:rPr lang="es-ES" dirty="0"/>
+              <a:t>Las bases de datos fueron extraídas de la INEC y </a:t>
+            </a:r>
+            <a:r>
+              <a:rPr lang="es-ES" dirty="0" err="1"/>
+              <a:t>kaggle</a:t>
+            </a:r>
+            <a:r>
+              <a:rPr lang="es-ES" dirty="0"/>
+              <a:t>, al igual que las mismas fueron trabajadas en </a:t>
+            </a:r>
+            <a:r>
+              <a:rPr lang="es-ES" dirty="0" err="1"/>
+              <a:t>excel</a:t>
+            </a:r>
+            <a:r>
+              <a:rPr lang="es-ES" dirty="0"/>
+              <a:t>.</a:t>
+            </a:r>
+          </a:p>
+        </p:txBody>
+      </p:sp>
+      <p:pic>
+        <p:nvPicPr>
+          <p:cNvPr id="1026" name="Picture 2" descr="Te damos la bienvenida a Colaboratory - Colaboratory">
+            <a:extLst>
+              <a:ext uri="{FF2B5EF4-FFF2-40B4-BE49-F238E27FC236}">
+                <a16:creationId xmlns:a16="http://schemas.microsoft.com/office/drawing/2014/main" id="{9B77A1AC-85DC-B2F9-7E32-087175D924CE}"/>
+              </a:ext>
+            </a:extLst>
+          </p:cNvPr>
+          <p:cNvPicPr>
+            <a:picLocks noChangeAspect="1" noChangeArrowheads="1"/>
+          </p:cNvPicPr>
+          <p:nvPr/>
+        </p:nvPicPr>
+        <p:blipFill>
+          <a:blip r:embed="rId2">
+            <a:extLst>
+              <a:ext uri="{28A0092B-C50C-407E-A947-70E740481C1C}">
+                <a14:useLocalDpi xmlns:a14="http://schemas.microsoft.com/office/drawing/2010/main" val="0"/>
+              </a:ext>
+            </a:extLst>
+          </a:blip>
+          <a:srcRect/>
+          <a:stretch>
+            <a:fillRect/>
+          </a:stretch>
+        </p:blipFill>
+        <p:spPr bwMode="auto">
+          <a:xfrm>
+            <a:off x="1983650" y="2123596"/>
+            <a:ext cx="2476500" cy="2476500"/>
+          </a:xfrm>
+          <a:prstGeom prst="rect">
+            <a:avLst/>
+          </a:prstGeom>
+          <a:noFill/>
+          <a:extLst>
+            <a:ext uri="{909E8E84-426E-40DD-AFC4-6F175D3DCCD1}">
+              <a14:hiddenFill xmlns:a14="http://schemas.microsoft.com/office/drawing/2010/main">
+                <a:solidFill>
+                  <a:srgbClr val="FFFFFF"/>
+                </a:solidFill>
+              </a14:hiddenFill>
+            </a:ext>
+          </a:extLst>
+        </p:spPr>
+      </p:pic>
+      <p:pic>
+        <p:nvPicPr>
+          <p:cNvPr id="8" name="Imagen 7">
+            <a:extLst>
+              <a:ext uri="{FF2B5EF4-FFF2-40B4-BE49-F238E27FC236}">
+                <a16:creationId xmlns:a16="http://schemas.microsoft.com/office/drawing/2014/main" id="{DF360BA2-8D25-AB32-58DA-BBBB8DCCFBFA}"/>
+              </a:ext>
+            </a:extLst>
+          </p:cNvPr>
+          <p:cNvPicPr>
+            <a:picLocks noChangeAspect="1"/>
+          </p:cNvPicPr>
+          <p:nvPr/>
+        </p:nvPicPr>
+        <p:blipFill>
+          <a:blip r:embed="rId3"/>
+          <a:stretch>
+            <a:fillRect/>
+          </a:stretch>
+        </p:blipFill>
+        <p:spPr>
+          <a:xfrm>
+            <a:off x="6935614" y="2772571"/>
+            <a:ext cx="2303260" cy="1312858"/>
+          </a:xfrm>
+          <a:prstGeom prst="rect">
+            <a:avLst/>
+          </a:prstGeom>
+        </p:spPr>
+      </p:pic>
+      <p:pic>
+        <p:nvPicPr>
+          <p:cNvPr id="9" name="Imagen 8">
+            <a:extLst>
+              <a:ext uri="{FF2B5EF4-FFF2-40B4-BE49-F238E27FC236}">
+                <a16:creationId xmlns:a16="http://schemas.microsoft.com/office/drawing/2014/main" id="{C46A18A1-491D-41F0-667E-6CD03FC88AA5}"/>
+              </a:ext>
+            </a:extLst>
+          </p:cNvPr>
+          <p:cNvPicPr>
+            <a:picLocks noChangeAspect="1"/>
+          </p:cNvPicPr>
+          <p:nvPr/>
+        </p:nvPicPr>
+        <p:blipFill>
+          <a:blip r:embed="rId4"/>
+          <a:stretch>
+            <a:fillRect/>
+          </a:stretch>
+        </p:blipFill>
+        <p:spPr>
+          <a:xfrm>
+            <a:off x="9716087" y="2772571"/>
+            <a:ext cx="1412150" cy="1312858"/>
+          </a:xfrm>
+          <a:prstGeom prst="rect">
+            <a:avLst/>
+          </a:prstGeom>
+        </p:spPr>
+      </p:pic>
+    </p:spTree>
+    <p:extLst>
+      <p:ext uri="{BB962C8B-B14F-4D97-AF65-F5344CB8AC3E}">
+        <p14:creationId xmlns:p14="http://schemas.microsoft.com/office/powerpoint/2010/main" val="1086021817"/>
+      </p:ext>
+    </p:extLst>
+  </p:cSld>
+  <p:clrMapOvr>
+    <a:masterClrMapping/>
+  </p:clrMapOvr>
+</p:sld>
+</file>
+
+<file path=ppt/slides/slide3.xml><?xml version="1.0" encoding="utf-8"?>
+<p:sld xmlns:a="http://schemas.openxmlformats.org/drawingml/2006/main" xmlns:r="http://schemas.openxmlformats.org/officeDocument/2006/relationships" xmlns:p="http://schemas.openxmlformats.org/presentationml/2006/main">
+  <p:cSld>
+    <p:spTree>
+      <p:nvGrpSpPr>
+        <p:cNvPr id="1" name=""/>
+        <p:cNvGrpSpPr/>
+        <p:nvPr/>
+      </p:nvGrpSpPr>
+      <p:grpSpPr>
+        <a:xfrm>
+          <a:off x="0" y="0"/>
+          <a:ext cx="0" cy="0"/>
+          <a:chOff x="0" y="0"/>
+          <a:chExt cx="0" cy="0"/>
+        </a:xfrm>
+      </p:grpSpPr>
+      <p:sp>
+        <p:nvSpPr>
+          <p:cNvPr id="2" name="Título 1">
+            <a:extLst>
+              <a:ext uri="{FF2B5EF4-FFF2-40B4-BE49-F238E27FC236}">
                 <a16:creationId xmlns:a16="http://schemas.microsoft.com/office/drawing/2014/main" id="{403C5A0F-721C-850E-7239-DAEA2E8C8CE8}"/>
               </a:ext>
             </a:extLst>
@@ -3771,6 +4143,12 @@
               <a:t>Me considero alguien muy amable, tímido, seguro de sí, siempre me aseguro de realizar mi mayor esfuerzo y lograr mis objetivos propuestos. He considerado mis fracasos como impulsos para mis éxitos, que no todo será perfecto.</a:t>
             </a:r>
           </a:p>
+          <a:p>
+            <a:pPr marL="0" indent="0">
+              <a:buNone/>
+            </a:pPr>
+            <a:endParaRPr lang="es-ES" dirty="0"/>
+          </a:p>
         </p:txBody>
       </p:sp>
     </p:spTree>
@@ -3786,7 +4164,7 @@
 </p:sld>
 </file>
 
-<file path=ppt/slides/slide3.xml><?xml version="1.0" encoding="utf-8"?>
+<file path=ppt/slides/slide4.xml><?xml version="1.0" encoding="utf-8"?>
 <p:sld xmlns:a="http://schemas.openxmlformats.org/drawingml/2006/main" xmlns:r="http://schemas.openxmlformats.org/officeDocument/2006/relationships" xmlns:p="http://schemas.openxmlformats.org/presentationml/2006/main">
   <p:cSld>
     <p:bg>
@@ -4055,7 +4433,7 @@
             </a:r>
             <a:r>
               <a:rPr lang="en-US" spc="-100" dirty="0" err="1"/>
-              <a:t>describí</a:t>
+              <a:t>descrubri</a:t>
             </a:r>
             <a:r>
               <a:rPr lang="en-US" spc="-100" dirty="0"/>
@@ -5374,7 +5752,7 @@
         </p:blipFill>
         <p:spPr>
           <a:xfrm>
-            <a:off x="796495" y="2636840"/>
+            <a:off x="839808" y="1921785"/>
             <a:ext cx="5031169" cy="3131903"/>
           </a:xfrm>
           <a:custGeom>
@@ -5425,7 +5803,7 @@
         </p:blipFill>
         <p:spPr>
           <a:xfrm>
-            <a:off x="6264162" y="2673037"/>
+            <a:off x="6237988" y="1957983"/>
             <a:ext cx="5184163" cy="3059506"/>
           </a:xfrm>
           <a:custGeom>
@@ -5623,6 +6001,237 @@
           </a:p>
         </p:txBody>
       </p:sp>
+      <p:sp>
+        <p:nvSpPr>
+          <p:cNvPr id="3" name="Marcador de contenido 2">
+            <a:extLst>
+              <a:ext uri="{FF2B5EF4-FFF2-40B4-BE49-F238E27FC236}">
+                <a16:creationId xmlns:a16="http://schemas.microsoft.com/office/drawing/2014/main" id="{A5A6A0FF-6CFD-A0A1-D433-0AEED8C41C00}"/>
+              </a:ext>
+            </a:extLst>
+          </p:cNvPr>
+          <p:cNvSpPr txBox="1">
+            <a:spLocks/>
+          </p:cNvSpPr>
+          <p:nvPr/>
+        </p:nvSpPr>
+        <p:spPr>
+          <a:xfrm>
+            <a:off x="586466" y="5153512"/>
+            <a:ext cx="10728325" cy="1301970"/>
+          </a:xfrm>
+          <a:prstGeom prst="rect">
+            <a:avLst/>
+          </a:prstGeom>
+        </p:spPr>
+        <p:txBody>
+          <a:bodyPr vert="horz" lIns="0" tIns="0" rIns="0" bIns="0" rtlCol="0">
+            <a:normAutofit/>
+          </a:bodyPr>
+          <a:lstStyle>
+            <a:lvl1pPr marL="228600" indent="-228600" algn="l" defTabSz="914400" rtl="0" eaLnBrk="1" latinLnBrk="0" hangingPunct="1">
+              <a:lnSpc>
+                <a:spcPct val="120000"/>
+              </a:lnSpc>
+              <a:spcBef>
+                <a:spcPts val="1000"/>
+              </a:spcBef>
+              <a:buClr>
+                <a:schemeClr val="accent4"/>
+              </a:buClr>
+              <a:buFont typeface="The Hand Extrablack" panose="03070A02030502020204" pitchFamily="66" charset="0"/>
+              <a:buChar char="•"/>
+              <a:defRPr sz="2000" kern="1200" spc="20" baseline="0">
+                <a:solidFill>
+                  <a:schemeClr val="tx1">
+                    <a:alpha val="58000"/>
+                  </a:schemeClr>
+                </a:solidFill>
+                <a:latin typeface="+mn-lt"/>
+                <a:ea typeface="+mn-ea"/>
+                <a:cs typeface="+mn-cs"/>
+              </a:defRPr>
+            </a:lvl1pPr>
+            <a:lvl2pPr marL="685800" indent="-228600" algn="l" defTabSz="914400" rtl="0" eaLnBrk="1" latinLnBrk="0" hangingPunct="1">
+              <a:lnSpc>
+                <a:spcPct val="120000"/>
+              </a:lnSpc>
+              <a:spcBef>
+                <a:spcPts val="500"/>
+              </a:spcBef>
+              <a:buClr>
+                <a:schemeClr val="accent4"/>
+              </a:buClr>
+              <a:buFont typeface="The Hand Extrablack" panose="03070A02030502020204" pitchFamily="66" charset="0"/>
+              <a:buChar char="•"/>
+              <a:defRPr sz="2000" kern="1200" spc="20" baseline="0">
+                <a:solidFill>
+                  <a:schemeClr val="tx1">
+                    <a:alpha val="58000"/>
+                  </a:schemeClr>
+                </a:solidFill>
+                <a:latin typeface="+mn-lt"/>
+                <a:ea typeface="+mn-ea"/>
+                <a:cs typeface="+mn-cs"/>
+              </a:defRPr>
+            </a:lvl2pPr>
+            <a:lvl3pPr marL="1143000" indent="-228600" algn="l" defTabSz="914400" rtl="0" eaLnBrk="1" latinLnBrk="0" hangingPunct="1">
+              <a:lnSpc>
+                <a:spcPct val="120000"/>
+              </a:lnSpc>
+              <a:spcBef>
+                <a:spcPts val="500"/>
+              </a:spcBef>
+              <a:buClr>
+                <a:schemeClr val="accent4"/>
+              </a:buClr>
+              <a:buFont typeface="The Hand Extrablack" panose="03070A02030502020204" pitchFamily="66" charset="0"/>
+              <a:buChar char="•"/>
+              <a:defRPr sz="2000" kern="1200" spc="20" baseline="0">
+                <a:solidFill>
+                  <a:schemeClr val="tx1">
+                    <a:alpha val="58000"/>
+                  </a:schemeClr>
+                </a:solidFill>
+                <a:latin typeface="+mn-lt"/>
+                <a:ea typeface="+mn-ea"/>
+                <a:cs typeface="+mn-cs"/>
+              </a:defRPr>
+            </a:lvl3pPr>
+            <a:lvl4pPr marL="1600200" indent="-228600" algn="l" defTabSz="914400" rtl="0" eaLnBrk="1" latinLnBrk="0" hangingPunct="1">
+              <a:lnSpc>
+                <a:spcPct val="120000"/>
+              </a:lnSpc>
+              <a:spcBef>
+                <a:spcPts val="500"/>
+              </a:spcBef>
+              <a:buClr>
+                <a:schemeClr val="accent4"/>
+              </a:buClr>
+              <a:buFont typeface="The Hand Extrablack" panose="03070A02030502020204" pitchFamily="66" charset="0"/>
+              <a:buChar char="•"/>
+              <a:defRPr sz="2000" kern="1200" spc="20" baseline="0">
+                <a:solidFill>
+                  <a:schemeClr val="tx1">
+                    <a:alpha val="58000"/>
+                  </a:schemeClr>
+                </a:solidFill>
+                <a:latin typeface="+mn-lt"/>
+                <a:ea typeface="+mn-ea"/>
+                <a:cs typeface="+mn-cs"/>
+              </a:defRPr>
+            </a:lvl4pPr>
+            <a:lvl5pPr marL="2057400" indent="-228600" algn="l" defTabSz="914400" rtl="0" eaLnBrk="1" latinLnBrk="0" hangingPunct="1">
+              <a:lnSpc>
+                <a:spcPct val="120000"/>
+              </a:lnSpc>
+              <a:spcBef>
+                <a:spcPts val="500"/>
+              </a:spcBef>
+              <a:buClr>
+                <a:schemeClr val="accent4"/>
+              </a:buClr>
+              <a:buFont typeface="The Hand Extrablack" panose="03070A02030502020204" pitchFamily="66" charset="0"/>
+              <a:buChar char="•"/>
+              <a:defRPr sz="2000" kern="1200" spc="20" baseline="0">
+                <a:solidFill>
+                  <a:schemeClr val="tx1">
+                    <a:alpha val="58000"/>
+                  </a:schemeClr>
+                </a:solidFill>
+                <a:latin typeface="+mn-lt"/>
+                <a:ea typeface="+mn-ea"/>
+                <a:cs typeface="+mn-cs"/>
+              </a:defRPr>
+            </a:lvl5pPr>
+            <a:lvl6pPr marL="2514600" indent="-228600" algn="l" defTabSz="914400" rtl="0" eaLnBrk="1" latinLnBrk="0" hangingPunct="1">
+              <a:lnSpc>
+                <a:spcPct val="90000"/>
+              </a:lnSpc>
+              <a:spcBef>
+                <a:spcPts val="500"/>
+              </a:spcBef>
+              <a:buFont typeface="Arial" panose="020B0604020202020204" pitchFamily="34" charset="0"/>
+              <a:buChar char="•"/>
+              <a:defRPr sz="1800" kern="1200">
+                <a:solidFill>
+                  <a:schemeClr val="tx1"/>
+                </a:solidFill>
+                <a:latin typeface="+mn-lt"/>
+                <a:ea typeface="+mn-ea"/>
+                <a:cs typeface="+mn-cs"/>
+              </a:defRPr>
+            </a:lvl6pPr>
+            <a:lvl7pPr marL="2971800" indent="-228600" algn="l" defTabSz="914400" rtl="0" eaLnBrk="1" latinLnBrk="0" hangingPunct="1">
+              <a:lnSpc>
+                <a:spcPct val="90000"/>
+              </a:lnSpc>
+              <a:spcBef>
+                <a:spcPts val="500"/>
+              </a:spcBef>
+              <a:buFont typeface="Arial" panose="020B0604020202020204" pitchFamily="34" charset="0"/>
+              <a:buChar char="•"/>
+              <a:defRPr sz="1800" kern="1200">
+                <a:solidFill>
+                  <a:schemeClr val="tx1"/>
+                </a:solidFill>
+                <a:latin typeface="+mn-lt"/>
+                <a:ea typeface="+mn-ea"/>
+                <a:cs typeface="+mn-cs"/>
+              </a:defRPr>
+            </a:lvl7pPr>
+            <a:lvl8pPr marL="3429000" indent="-228600" algn="l" defTabSz="914400" rtl="0" eaLnBrk="1" latinLnBrk="0" hangingPunct="1">
+              <a:lnSpc>
+                <a:spcPct val="90000"/>
+              </a:lnSpc>
+              <a:spcBef>
+                <a:spcPts val="500"/>
+              </a:spcBef>
+              <a:buFont typeface="Arial" panose="020B0604020202020204" pitchFamily="34" charset="0"/>
+              <a:buChar char="•"/>
+              <a:defRPr sz="1800" kern="1200">
+                <a:solidFill>
+                  <a:schemeClr val="tx1"/>
+                </a:solidFill>
+                <a:latin typeface="+mn-lt"/>
+                <a:ea typeface="+mn-ea"/>
+                <a:cs typeface="+mn-cs"/>
+              </a:defRPr>
+            </a:lvl8pPr>
+            <a:lvl9pPr marL="3886200" indent="-228600" algn="l" defTabSz="914400" rtl="0" eaLnBrk="1" latinLnBrk="0" hangingPunct="1">
+              <a:lnSpc>
+                <a:spcPct val="90000"/>
+              </a:lnSpc>
+              <a:spcBef>
+                <a:spcPts val="500"/>
+              </a:spcBef>
+              <a:buFont typeface="Arial" panose="020B0604020202020204" pitchFamily="34" charset="0"/>
+              <a:buChar char="•"/>
+              <a:defRPr sz="1800" kern="1200">
+                <a:solidFill>
+                  <a:schemeClr val="tx1"/>
+                </a:solidFill>
+                <a:latin typeface="+mn-lt"/>
+                <a:ea typeface="+mn-ea"/>
+                <a:cs typeface="+mn-cs"/>
+              </a:defRPr>
+            </a:lvl9pPr>
+          </a:lstStyle>
+          <a:p>
+            <a:r>
+              <a:rPr lang="es-ES" dirty="0"/>
+              <a:t>Al principio, había muchos sesgos en las bases de datos escogidas, sin embargo, con la reunión que se mantuvo con el profesor, pude ver que en si los datos eran muy grandes a las comparaciones que estaba realizando, como se puede ver en la imagen.</a:t>
+            </a:r>
+          </a:p>
+          <a:p>
+            <a:pPr marL="0" indent="0">
+              <a:buFont typeface="The Hand Extrablack" panose="03070A02030502020204" pitchFamily="66" charset="0"/>
+              <a:buNone/>
+            </a:pPr>
+            <a:endParaRPr lang="es-ES" dirty="0"/>
+          </a:p>
+        </p:txBody>
+      </p:sp>
     </p:spTree>
     <p:extLst>
       <p:ext uri="{BB962C8B-B14F-4D97-AF65-F5344CB8AC3E}">
@@ -5636,7 +6245,7 @@
 </p:sld>
 </file>
 
-<file path=ppt/slides/slide4.xml><?xml version="1.0" encoding="utf-8"?>
+<file path=ppt/slides/slide5.xml><?xml version="1.0" encoding="utf-8"?>
 <p:sld xmlns:a="http://schemas.openxmlformats.org/drawingml/2006/main" xmlns:r="http://schemas.openxmlformats.org/officeDocument/2006/relationships" xmlns:p="http://schemas.openxmlformats.org/presentationml/2006/main">
   <p:cSld>
     <p:bg>
@@ -5896,7 +6505,7 @@
               <a:t>¿</a:t>
             </a:r>
             <a:r>
-              <a:rPr lang="en-US" spc="-100"/>
+              <a:rPr lang="en-US" spc="-100" dirty="0" err="1"/>
               <a:t>Qué</a:t>
             </a:r>
             <a:r>
@@ -5904,15 +6513,15 @@
               <a:t> </a:t>
             </a:r>
             <a:r>
-              <a:rPr lang="en-US" spc="-100"/>
-              <a:t>describí</a:t>
+              <a:rPr lang="en-US" spc="-100" dirty="0" err="1"/>
+              <a:t>descubri</a:t>
             </a:r>
             <a:r>
               <a:rPr lang="en-US" spc="-100" dirty="0"/>
               <a:t> de </a:t>
             </a:r>
             <a:r>
-              <a:rPr lang="en-US" spc="-100"/>
+              <a:rPr lang="en-US" spc="-100" dirty="0" err="1"/>
               <a:t>los</a:t>
             </a:r>
             <a:r>
@@ -5920,14 +6529,13 @@
               <a:t> </a:t>
             </a:r>
             <a:r>
-              <a:rPr lang="en-US" spc="-100"/>
+              <a:rPr lang="en-US" spc="-100" dirty="0" err="1"/>
               <a:t>datos</a:t>
             </a:r>
             <a:r>
               <a:rPr lang="en-US" spc="-100" dirty="0"/>
               <a:t>?</a:t>
             </a:r>
-            <a:endParaRPr lang="en-US" spc="-100"/>
           </a:p>
         </p:txBody>
       </p:sp>
@@ -7223,7 +7831,7 @@
         </p:blipFill>
         <p:spPr>
           <a:xfrm>
-            <a:off x="719999" y="3016915"/>
+            <a:off x="743677" y="2090858"/>
             <a:ext cx="5184162" cy="2371753"/>
           </a:xfrm>
           <a:custGeom>
@@ -7276,7 +7884,7 @@
         </p:blipFill>
         <p:spPr>
           <a:xfrm>
-            <a:off x="6264162" y="3023393"/>
+            <a:off x="6237988" y="2097959"/>
             <a:ext cx="5184163" cy="2358794"/>
           </a:xfrm>
           <a:custGeom>
@@ -7474,10 +8082,997 @@
           </a:p>
         </p:txBody>
       </p:sp>
+      <p:sp>
+        <p:nvSpPr>
+          <p:cNvPr id="3" name="Marcador de contenido 2">
+            <a:extLst>
+              <a:ext uri="{FF2B5EF4-FFF2-40B4-BE49-F238E27FC236}">
+                <a16:creationId xmlns:a16="http://schemas.microsoft.com/office/drawing/2014/main" id="{350B7B0F-0FA5-8887-986F-34EFA581B77D}"/>
+              </a:ext>
+            </a:extLst>
+          </p:cNvPr>
+          <p:cNvSpPr txBox="1">
+            <a:spLocks/>
+          </p:cNvSpPr>
+          <p:nvPr/>
+        </p:nvSpPr>
+        <p:spPr>
+          <a:xfrm>
+            <a:off x="586466" y="4782887"/>
+            <a:ext cx="10728325" cy="1575710"/>
+          </a:xfrm>
+          <a:prstGeom prst="rect">
+            <a:avLst/>
+          </a:prstGeom>
+        </p:spPr>
+        <p:txBody>
+          <a:bodyPr vert="horz" lIns="0" tIns="0" rIns="0" bIns="0" rtlCol="0">
+            <a:normAutofit/>
+          </a:bodyPr>
+          <a:lstStyle>
+            <a:lvl1pPr marL="228600" indent="-228600" algn="l" defTabSz="914400" rtl="0" eaLnBrk="1" latinLnBrk="0" hangingPunct="1">
+              <a:lnSpc>
+                <a:spcPct val="120000"/>
+              </a:lnSpc>
+              <a:spcBef>
+                <a:spcPts val="1000"/>
+              </a:spcBef>
+              <a:buClr>
+                <a:schemeClr val="accent4"/>
+              </a:buClr>
+              <a:buFont typeface="The Hand Extrablack" panose="03070A02030502020204" pitchFamily="66" charset="0"/>
+              <a:buChar char="•"/>
+              <a:defRPr sz="2000" kern="1200" spc="20" baseline="0">
+                <a:solidFill>
+                  <a:schemeClr val="tx1">
+                    <a:alpha val="58000"/>
+                  </a:schemeClr>
+                </a:solidFill>
+                <a:latin typeface="+mn-lt"/>
+                <a:ea typeface="+mn-ea"/>
+                <a:cs typeface="+mn-cs"/>
+              </a:defRPr>
+            </a:lvl1pPr>
+            <a:lvl2pPr marL="685800" indent="-228600" algn="l" defTabSz="914400" rtl="0" eaLnBrk="1" latinLnBrk="0" hangingPunct="1">
+              <a:lnSpc>
+                <a:spcPct val="120000"/>
+              </a:lnSpc>
+              <a:spcBef>
+                <a:spcPts val="500"/>
+              </a:spcBef>
+              <a:buClr>
+                <a:schemeClr val="accent4"/>
+              </a:buClr>
+              <a:buFont typeface="The Hand Extrablack" panose="03070A02030502020204" pitchFamily="66" charset="0"/>
+              <a:buChar char="•"/>
+              <a:defRPr sz="2000" kern="1200" spc="20" baseline="0">
+                <a:solidFill>
+                  <a:schemeClr val="tx1">
+                    <a:alpha val="58000"/>
+                  </a:schemeClr>
+                </a:solidFill>
+                <a:latin typeface="+mn-lt"/>
+                <a:ea typeface="+mn-ea"/>
+                <a:cs typeface="+mn-cs"/>
+              </a:defRPr>
+            </a:lvl2pPr>
+            <a:lvl3pPr marL="1143000" indent="-228600" algn="l" defTabSz="914400" rtl="0" eaLnBrk="1" latinLnBrk="0" hangingPunct="1">
+              <a:lnSpc>
+                <a:spcPct val="120000"/>
+              </a:lnSpc>
+              <a:spcBef>
+                <a:spcPts val="500"/>
+              </a:spcBef>
+              <a:buClr>
+                <a:schemeClr val="accent4"/>
+              </a:buClr>
+              <a:buFont typeface="The Hand Extrablack" panose="03070A02030502020204" pitchFamily="66" charset="0"/>
+              <a:buChar char="•"/>
+              <a:defRPr sz="2000" kern="1200" spc="20" baseline="0">
+                <a:solidFill>
+                  <a:schemeClr val="tx1">
+                    <a:alpha val="58000"/>
+                  </a:schemeClr>
+                </a:solidFill>
+                <a:latin typeface="+mn-lt"/>
+                <a:ea typeface="+mn-ea"/>
+                <a:cs typeface="+mn-cs"/>
+              </a:defRPr>
+            </a:lvl3pPr>
+            <a:lvl4pPr marL="1600200" indent="-228600" algn="l" defTabSz="914400" rtl="0" eaLnBrk="1" latinLnBrk="0" hangingPunct="1">
+              <a:lnSpc>
+                <a:spcPct val="120000"/>
+              </a:lnSpc>
+              <a:spcBef>
+                <a:spcPts val="500"/>
+              </a:spcBef>
+              <a:buClr>
+                <a:schemeClr val="accent4"/>
+              </a:buClr>
+              <a:buFont typeface="The Hand Extrablack" panose="03070A02030502020204" pitchFamily="66" charset="0"/>
+              <a:buChar char="•"/>
+              <a:defRPr sz="2000" kern="1200" spc="20" baseline="0">
+                <a:solidFill>
+                  <a:schemeClr val="tx1">
+                    <a:alpha val="58000"/>
+                  </a:schemeClr>
+                </a:solidFill>
+                <a:latin typeface="+mn-lt"/>
+                <a:ea typeface="+mn-ea"/>
+                <a:cs typeface="+mn-cs"/>
+              </a:defRPr>
+            </a:lvl4pPr>
+            <a:lvl5pPr marL="2057400" indent="-228600" algn="l" defTabSz="914400" rtl="0" eaLnBrk="1" latinLnBrk="0" hangingPunct="1">
+              <a:lnSpc>
+                <a:spcPct val="120000"/>
+              </a:lnSpc>
+              <a:spcBef>
+                <a:spcPts val="500"/>
+              </a:spcBef>
+              <a:buClr>
+                <a:schemeClr val="accent4"/>
+              </a:buClr>
+              <a:buFont typeface="The Hand Extrablack" panose="03070A02030502020204" pitchFamily="66" charset="0"/>
+              <a:buChar char="•"/>
+              <a:defRPr sz="2000" kern="1200" spc="20" baseline="0">
+                <a:solidFill>
+                  <a:schemeClr val="tx1">
+                    <a:alpha val="58000"/>
+                  </a:schemeClr>
+                </a:solidFill>
+                <a:latin typeface="+mn-lt"/>
+                <a:ea typeface="+mn-ea"/>
+                <a:cs typeface="+mn-cs"/>
+              </a:defRPr>
+            </a:lvl5pPr>
+            <a:lvl6pPr marL="2514600" indent="-228600" algn="l" defTabSz="914400" rtl="0" eaLnBrk="1" latinLnBrk="0" hangingPunct="1">
+              <a:lnSpc>
+                <a:spcPct val="90000"/>
+              </a:lnSpc>
+              <a:spcBef>
+                <a:spcPts val="500"/>
+              </a:spcBef>
+              <a:buFont typeface="Arial" panose="020B0604020202020204" pitchFamily="34" charset="0"/>
+              <a:buChar char="•"/>
+              <a:defRPr sz="1800" kern="1200">
+                <a:solidFill>
+                  <a:schemeClr val="tx1"/>
+                </a:solidFill>
+                <a:latin typeface="+mn-lt"/>
+                <a:ea typeface="+mn-ea"/>
+                <a:cs typeface="+mn-cs"/>
+              </a:defRPr>
+            </a:lvl6pPr>
+            <a:lvl7pPr marL="2971800" indent="-228600" algn="l" defTabSz="914400" rtl="0" eaLnBrk="1" latinLnBrk="0" hangingPunct="1">
+              <a:lnSpc>
+                <a:spcPct val="90000"/>
+              </a:lnSpc>
+              <a:spcBef>
+                <a:spcPts val="500"/>
+              </a:spcBef>
+              <a:buFont typeface="Arial" panose="020B0604020202020204" pitchFamily="34" charset="0"/>
+              <a:buChar char="•"/>
+              <a:defRPr sz="1800" kern="1200">
+                <a:solidFill>
+                  <a:schemeClr val="tx1"/>
+                </a:solidFill>
+                <a:latin typeface="+mn-lt"/>
+                <a:ea typeface="+mn-ea"/>
+                <a:cs typeface="+mn-cs"/>
+              </a:defRPr>
+            </a:lvl7pPr>
+            <a:lvl8pPr marL="3429000" indent="-228600" algn="l" defTabSz="914400" rtl="0" eaLnBrk="1" latinLnBrk="0" hangingPunct="1">
+              <a:lnSpc>
+                <a:spcPct val="90000"/>
+              </a:lnSpc>
+              <a:spcBef>
+                <a:spcPts val="500"/>
+              </a:spcBef>
+              <a:buFont typeface="Arial" panose="020B0604020202020204" pitchFamily="34" charset="0"/>
+              <a:buChar char="•"/>
+              <a:defRPr sz="1800" kern="1200">
+                <a:solidFill>
+                  <a:schemeClr val="tx1"/>
+                </a:solidFill>
+                <a:latin typeface="+mn-lt"/>
+                <a:ea typeface="+mn-ea"/>
+                <a:cs typeface="+mn-cs"/>
+              </a:defRPr>
+            </a:lvl8pPr>
+            <a:lvl9pPr marL="3886200" indent="-228600" algn="l" defTabSz="914400" rtl="0" eaLnBrk="1" latinLnBrk="0" hangingPunct="1">
+              <a:lnSpc>
+                <a:spcPct val="90000"/>
+              </a:lnSpc>
+              <a:spcBef>
+                <a:spcPts val="500"/>
+              </a:spcBef>
+              <a:buFont typeface="Arial" panose="020B0604020202020204" pitchFamily="34" charset="0"/>
+              <a:buChar char="•"/>
+              <a:defRPr sz="1800" kern="1200">
+                <a:solidFill>
+                  <a:schemeClr val="tx1"/>
+                </a:solidFill>
+                <a:latin typeface="+mn-lt"/>
+                <a:ea typeface="+mn-ea"/>
+                <a:cs typeface="+mn-cs"/>
+              </a:defRPr>
+            </a:lvl9pPr>
+          </a:lstStyle>
+          <a:p>
+            <a:r>
+              <a:rPr lang="es-ES" dirty="0"/>
+              <a:t>Después de la reunión, pude ver qué al comparar los datos similares, y con nuevas bases de datos que tuvieran dicha información similar, se pudo ver la gran diferencia en tanto los histogramas como </a:t>
+            </a:r>
+            <a:r>
+              <a:rPr lang="es-ES" dirty="0" err="1"/>
+              <a:t>Paretogramas</a:t>
+            </a:r>
+            <a:r>
+              <a:rPr lang="es-ES" dirty="0"/>
+              <a:t>, y se pudo dar un análisis muy conveniente para los datos.</a:t>
+            </a:r>
+          </a:p>
+          <a:p>
+            <a:pPr marL="0" indent="0">
+              <a:buFont typeface="The Hand Extrablack" panose="03070A02030502020204" pitchFamily="66" charset="0"/>
+              <a:buNone/>
+            </a:pPr>
+            <a:endParaRPr lang="es-ES" dirty="0"/>
+          </a:p>
+        </p:txBody>
+      </p:sp>
     </p:spTree>
     <p:extLst>
       <p:ext uri="{BB962C8B-B14F-4D97-AF65-F5344CB8AC3E}">
         <p14:creationId xmlns:p14="http://schemas.microsoft.com/office/powerpoint/2010/main" val="4074204056"/>
+      </p:ext>
+    </p:extLst>
+  </p:cSld>
+  <p:clrMapOvr>
+    <a:masterClrMapping/>
+  </p:clrMapOvr>
+</p:sld>
+</file>
+
+<file path=ppt/slides/slide6.xml><?xml version="1.0" encoding="utf-8"?>
+<p:sld xmlns:a="http://schemas.openxmlformats.org/drawingml/2006/main" xmlns:r="http://schemas.openxmlformats.org/officeDocument/2006/relationships" xmlns:p="http://schemas.openxmlformats.org/presentationml/2006/main">
+  <p:cSld>
+    <p:bg>
+      <p:bgPr>
+        <a:solidFill>
+          <a:schemeClr val="bg2"/>
+        </a:solidFill>
+        <a:effectLst/>
+      </p:bgPr>
+    </p:bg>
+    <p:spTree>
+      <p:nvGrpSpPr>
+        <p:cNvPr id="1" name=""/>
+        <p:cNvGrpSpPr/>
+        <p:nvPr/>
+      </p:nvGrpSpPr>
+      <p:grpSpPr>
+        <a:xfrm>
+          <a:off x="0" y="0"/>
+          <a:ext cx="0" cy="0"/>
+          <a:chOff x="0" y="0"/>
+          <a:chExt cx="0" cy="0"/>
+        </a:xfrm>
+      </p:grpSpPr>
+      <p:sp useBgFill="1">
+        <p:nvSpPr>
+          <p:cNvPr id="10" name="Rectangle 9">
+            <a:extLst>
+              <a:ext uri="{FF2B5EF4-FFF2-40B4-BE49-F238E27FC236}">
+                <a16:creationId xmlns:a16="http://schemas.microsoft.com/office/drawing/2014/main" id="{11F4D251-B7D8-402D-950A-F9D15396E94B}"/>
+              </a:ext>
+              <a:ext uri="{C183D7F6-B498-43B3-948B-1728B52AA6E4}">
+                <adec:decorative xmlns:adec="http://schemas.microsoft.com/office/drawing/2017/decorative" val="1"/>
+              </a:ext>
+            </a:extLst>
+          </p:cNvPr>
+          <p:cNvSpPr>
+            <a:spLocks noGrp="1" noRot="1" noChangeAspect="1" noMove="1" noResize="1" noEditPoints="1" noAdjustHandles="1" noChangeArrowheads="1" noChangeShapeType="1" noTextEdit="1"/>
+          </p:cNvSpPr>
+          <p:nvPr>
+            <p:extLst>
+              <p:ext uri="{386F3935-93C4-4BCD-93E2-E3B085C9AB24}">
+                <p16:designElem xmlns:p16="http://schemas.microsoft.com/office/powerpoint/2015/main" val="1"/>
+              </p:ext>
+            </p:extLst>
+          </p:nvPr>
+        </p:nvSpPr>
+        <p:spPr>
+          <a:xfrm>
+            <a:off x="0" y="0"/>
+            <a:ext cx="12192000" cy="6858000"/>
+          </a:xfrm>
+          <a:prstGeom prst="rect">
+            <a:avLst/>
+          </a:prstGeom>
+          <a:ln w="12700" cap="flat" cmpd="sng" algn="ctr">
+            <a:noFill/>
+            <a:prstDash val="solid"/>
+            <a:miter lim="800000"/>
+          </a:ln>
+          <a:effectLst/>
+        </p:spPr>
+        <p:style>
+          <a:lnRef idx="2">
+            <a:schemeClr val="accent1">
+              <a:shade val="50000"/>
+            </a:schemeClr>
+          </a:lnRef>
+          <a:fillRef idx="1">
+            <a:schemeClr val="accent1"/>
+          </a:fillRef>
+          <a:effectRef idx="0">
+            <a:schemeClr val="accent1"/>
+          </a:effectRef>
+          <a:fontRef idx="minor">
+            <a:schemeClr val="lt1"/>
+          </a:fontRef>
+        </p:style>
+        <p:txBody>
+          <a:bodyPr rtlCol="0" anchor="ctr"/>
+          <a:lstStyle/>
+          <a:p>
+            <a:pPr algn="ctr"/>
+            <a:endParaRPr lang="en-US"/>
+          </a:p>
+        </p:txBody>
+      </p:sp>
+      <p:sp>
+        <p:nvSpPr>
+          <p:cNvPr id="4" name="Título 3">
+            <a:extLst>
+              <a:ext uri="{FF2B5EF4-FFF2-40B4-BE49-F238E27FC236}">
+                <a16:creationId xmlns:a16="http://schemas.microsoft.com/office/drawing/2014/main" id="{494B86A4-DCCA-653B-BD3B-CE85211C9034}"/>
+              </a:ext>
+            </a:extLst>
+          </p:cNvPr>
+          <p:cNvSpPr>
+            <a:spLocks noGrp="1"/>
+          </p:cNvSpPr>
+          <p:nvPr>
+            <p:ph type="ctrTitle"/>
+          </p:nvPr>
+        </p:nvSpPr>
+        <p:spPr>
+          <a:xfrm>
+            <a:off x="6480000" y="728663"/>
+            <a:ext cx="5015638" cy="2795737"/>
+          </a:xfrm>
+        </p:spPr>
+        <p:txBody>
+          <a:bodyPr>
+            <a:normAutofit/>
+          </a:bodyPr>
+          <a:lstStyle/>
+          <a:p>
+            <a:r>
+              <a:rPr lang="es-ES" dirty="0"/>
+              <a:t>Muchas Gracias</a:t>
+            </a:r>
+          </a:p>
+        </p:txBody>
+      </p:sp>
+      <p:pic>
+        <p:nvPicPr>
+          <p:cNvPr id="6" name="Picture 5" descr="Patrón de fondo, Gráfico de superficie&#10;&#10;Descripción generada automáticamente">
+            <a:extLst>
+              <a:ext uri="{FF2B5EF4-FFF2-40B4-BE49-F238E27FC236}">
+                <a16:creationId xmlns:a16="http://schemas.microsoft.com/office/drawing/2014/main" id="{5218D41E-ECD8-906D-E863-A1393352BDA3}"/>
+              </a:ext>
+            </a:extLst>
+          </p:cNvPr>
+          <p:cNvPicPr>
+            <a:picLocks noChangeAspect="1"/>
+          </p:cNvPicPr>
+          <p:nvPr/>
+        </p:nvPicPr>
+        <p:blipFill rotWithShape="1">
+          <a:blip r:embed="rId2"/>
+          <a:srcRect l="8283" r="9143"/>
+          <a:stretch/>
+        </p:blipFill>
+        <p:spPr>
+          <a:xfrm>
+            <a:off x="1" y="10"/>
+            <a:ext cx="5662934" cy="6857990"/>
+          </a:xfrm>
+          <a:custGeom>
+            <a:avLst/>
+            <a:gdLst/>
+            <a:ahLst/>
+            <a:cxnLst/>
+            <a:rect l="l" t="t" r="r" b="b"/>
+            <a:pathLst>
+              <a:path w="5662934" h="6858000">
+                <a:moveTo>
+                  <a:pt x="0" y="0"/>
+                </a:moveTo>
+                <a:lnTo>
+                  <a:pt x="5064602" y="0"/>
+                </a:lnTo>
+                <a:lnTo>
+                  <a:pt x="4889880" y="279455"/>
+                </a:lnTo>
+                <a:cubicBezTo>
+                  <a:pt x="4472355" y="1021447"/>
+                  <a:pt x="4263593" y="1948936"/>
+                  <a:pt x="4263593" y="3061922"/>
+                </a:cubicBezTo>
+                <a:cubicBezTo>
+                  <a:pt x="4263593" y="3516203"/>
+                  <a:pt x="4324186" y="3970483"/>
+                  <a:pt x="4445372" y="4515619"/>
+                </a:cubicBezTo>
+                <a:cubicBezTo>
+                  <a:pt x="4596855" y="5030470"/>
+                  <a:pt x="4748338" y="5515036"/>
+                  <a:pt x="4990710" y="5969316"/>
+                </a:cubicBezTo>
+                <a:cubicBezTo>
+                  <a:pt x="5172489" y="6275955"/>
+                  <a:pt x="5371310" y="6544265"/>
+                  <a:pt x="5583977" y="6777438"/>
+                </a:cubicBezTo>
+                <a:lnTo>
+                  <a:pt x="5662934" y="6858000"/>
+                </a:lnTo>
+                <a:lnTo>
+                  <a:pt x="0" y="6858000"/>
+                </a:lnTo>
+                <a:close/>
+              </a:path>
+            </a:pathLst>
+          </a:custGeom>
+        </p:spPr>
+      </p:pic>
+      <p:sp>
+        <p:nvSpPr>
+          <p:cNvPr id="12" name="Freeform 10">
+            <a:extLst>
+              <a:ext uri="{FF2B5EF4-FFF2-40B4-BE49-F238E27FC236}">
+                <a16:creationId xmlns:a16="http://schemas.microsoft.com/office/drawing/2014/main" id="{E67870A8-BE17-461C-AD58-035AD7FA02CB}"/>
+              </a:ext>
+              <a:ext uri="{C183D7F6-B498-43B3-948B-1728B52AA6E4}">
+                <adec:decorative xmlns:adec="http://schemas.microsoft.com/office/drawing/2017/decorative" val="1"/>
+              </a:ext>
+            </a:extLst>
+          </p:cNvPr>
+          <p:cNvSpPr>
+            <a:spLocks noGrp="1" noRot="1" noChangeAspect="1" noMove="1" noResize="1" noEditPoints="1" noAdjustHandles="1" noChangeArrowheads="1" noChangeShapeType="1" noTextEdit="1"/>
+          </p:cNvSpPr>
+          <p:nvPr>
+            <p:extLst>
+              <p:ext uri="{386F3935-93C4-4BCD-93E2-E3B085C9AB24}">
+                <p16:designElem xmlns:p16="http://schemas.microsoft.com/office/powerpoint/2015/main" val="1"/>
+              </p:ext>
+            </p:extLst>
+          </p:nvPr>
+        </p:nvSpPr>
+        <p:spPr bwMode="auto">
+          <a:xfrm rot="7291575">
+            <a:off x="3479502" y="491434"/>
+            <a:ext cx="2397877" cy="2244442"/>
+          </a:xfrm>
+          <a:custGeom>
+            <a:avLst/>
+            <a:gdLst>
+              <a:gd name="T0" fmla="*/ 43 w 250"/>
+              <a:gd name="T1" fmla="*/ 167 h 234"/>
+              <a:gd name="T2" fmla="*/ 70 w 250"/>
+              <a:gd name="T3" fmla="*/ 133 h 234"/>
+              <a:gd name="T4" fmla="*/ 48 w 250"/>
+              <a:gd name="T5" fmla="*/ 134 h 234"/>
+              <a:gd name="T6" fmla="*/ 19 w 250"/>
+              <a:gd name="T7" fmla="*/ 130 h 234"/>
+              <a:gd name="T8" fmla="*/ 6 w 250"/>
+              <a:gd name="T9" fmla="*/ 123 h 234"/>
+              <a:gd name="T10" fmla="*/ 1 w 250"/>
+              <a:gd name="T11" fmla="*/ 103 h 234"/>
+              <a:gd name="T12" fmla="*/ 11 w 250"/>
+              <a:gd name="T13" fmla="*/ 81 h 234"/>
+              <a:gd name="T14" fmla="*/ 23 w 250"/>
+              <a:gd name="T15" fmla="*/ 76 h 234"/>
+              <a:gd name="T16" fmla="*/ 81 w 250"/>
+              <a:gd name="T17" fmla="*/ 78 h 234"/>
+              <a:gd name="T18" fmla="*/ 65 w 250"/>
+              <a:gd name="T19" fmla="*/ 49 h 234"/>
+              <a:gd name="T20" fmla="*/ 57 w 250"/>
+              <a:gd name="T21" fmla="*/ 27 h 234"/>
+              <a:gd name="T22" fmla="*/ 67 w 250"/>
+              <a:gd name="T23" fmla="*/ 12 h 234"/>
+              <a:gd name="T24" fmla="*/ 85 w 250"/>
+              <a:gd name="T25" fmla="*/ 1 h 234"/>
+              <a:gd name="T26" fmla="*/ 101 w 250"/>
+              <a:gd name="T27" fmla="*/ 8 h 234"/>
+              <a:gd name="T28" fmla="*/ 107 w 250"/>
+              <a:gd name="T29" fmla="*/ 15 h 234"/>
+              <a:gd name="T30" fmla="*/ 120 w 250"/>
+              <a:gd name="T31" fmla="*/ 37 h 234"/>
+              <a:gd name="T32" fmla="*/ 131 w 250"/>
+              <a:gd name="T33" fmla="*/ 60 h 234"/>
+              <a:gd name="T34" fmla="*/ 164 w 250"/>
+              <a:gd name="T35" fmla="*/ 25 h 234"/>
+              <a:gd name="T36" fmla="*/ 187 w 250"/>
+              <a:gd name="T37" fmla="*/ 11 h 234"/>
+              <a:gd name="T38" fmla="*/ 205 w 250"/>
+              <a:gd name="T39" fmla="*/ 19 h 234"/>
+              <a:gd name="T40" fmla="*/ 214 w 250"/>
+              <a:gd name="T41" fmla="*/ 34 h 234"/>
+              <a:gd name="T42" fmla="*/ 203 w 250"/>
+              <a:gd name="T43" fmla="*/ 57 h 234"/>
+              <a:gd name="T44" fmla="*/ 166 w 250"/>
+              <a:gd name="T45" fmla="*/ 100 h 234"/>
+              <a:gd name="T46" fmla="*/ 217 w 250"/>
+              <a:gd name="T47" fmla="*/ 98 h 234"/>
+              <a:gd name="T48" fmla="*/ 244 w 250"/>
+              <a:gd name="T49" fmla="*/ 104 h 234"/>
+              <a:gd name="T50" fmla="*/ 249 w 250"/>
+              <a:gd name="T51" fmla="*/ 115 h 234"/>
+              <a:gd name="T52" fmla="*/ 247 w 250"/>
+              <a:gd name="T53" fmla="*/ 129 h 234"/>
+              <a:gd name="T54" fmla="*/ 245 w 250"/>
+              <a:gd name="T55" fmla="*/ 134 h 234"/>
+              <a:gd name="T56" fmla="*/ 241 w 250"/>
+              <a:gd name="T57" fmla="*/ 141 h 234"/>
+              <a:gd name="T58" fmla="*/ 227 w 250"/>
+              <a:gd name="T59" fmla="*/ 147 h 234"/>
+              <a:gd name="T60" fmla="*/ 187 w 250"/>
+              <a:gd name="T61" fmla="*/ 151 h 234"/>
+              <a:gd name="T62" fmla="*/ 160 w 250"/>
+              <a:gd name="T63" fmla="*/ 148 h 234"/>
+              <a:gd name="T64" fmla="*/ 168 w 250"/>
+              <a:gd name="T65" fmla="*/ 168 h 234"/>
+              <a:gd name="T66" fmla="*/ 176 w 250"/>
+              <a:gd name="T67" fmla="*/ 194 h 234"/>
+              <a:gd name="T68" fmla="*/ 176 w 250"/>
+              <a:gd name="T69" fmla="*/ 211 h 234"/>
+              <a:gd name="T70" fmla="*/ 170 w 250"/>
+              <a:gd name="T71" fmla="*/ 221 h 234"/>
+              <a:gd name="T72" fmla="*/ 156 w 250"/>
+              <a:gd name="T73" fmla="*/ 230 h 234"/>
+              <a:gd name="T74" fmla="*/ 130 w 250"/>
+              <a:gd name="T75" fmla="*/ 226 h 234"/>
+              <a:gd name="T76" fmla="*/ 122 w 250"/>
+              <a:gd name="T77" fmla="*/ 213 h 234"/>
+              <a:gd name="T78" fmla="*/ 110 w 250"/>
+              <a:gd name="T79" fmla="*/ 169 h 234"/>
+              <a:gd name="T80" fmla="*/ 92 w 250"/>
+              <a:gd name="T81" fmla="*/ 192 h 234"/>
+              <a:gd name="T82" fmla="*/ 87 w 250"/>
+              <a:gd name="T83" fmla="*/ 197 h 234"/>
+              <a:gd name="T84" fmla="*/ 84 w 250"/>
+              <a:gd name="T85" fmla="*/ 201 h 234"/>
+              <a:gd name="T86" fmla="*/ 65 w 250"/>
+              <a:gd name="T87" fmla="*/ 212 h 234"/>
+              <a:gd name="T88" fmla="*/ 50 w 250"/>
+              <a:gd name="T89" fmla="*/ 204 h 234"/>
+              <a:gd name="T90" fmla="*/ 44 w 250"/>
+              <a:gd name="T91" fmla="*/ 198 h 234"/>
+              <a:gd name="T92" fmla="*/ 38 w 250"/>
+              <a:gd name="T93" fmla="*/ 185 h 234"/>
+              <a:gd name="T94" fmla="*/ 43 w 250"/>
+              <a:gd name="T95" fmla="*/ 167 h 234"/>
+            </a:gdLst>
+            <a:ahLst/>
+            <a:cxnLst>
+              <a:cxn ang="0">
+                <a:pos x="T0" y="T1"/>
+              </a:cxn>
+              <a:cxn ang="0">
+                <a:pos x="T2" y="T3"/>
+              </a:cxn>
+              <a:cxn ang="0">
+                <a:pos x="T4" y="T5"/>
+              </a:cxn>
+              <a:cxn ang="0">
+                <a:pos x="T6" y="T7"/>
+              </a:cxn>
+              <a:cxn ang="0">
+                <a:pos x="T8" y="T9"/>
+              </a:cxn>
+              <a:cxn ang="0">
+                <a:pos x="T10" y="T11"/>
+              </a:cxn>
+              <a:cxn ang="0">
+                <a:pos x="T12" y="T13"/>
+              </a:cxn>
+              <a:cxn ang="0">
+                <a:pos x="T14" y="T15"/>
+              </a:cxn>
+              <a:cxn ang="0">
+                <a:pos x="T16" y="T17"/>
+              </a:cxn>
+              <a:cxn ang="0">
+                <a:pos x="T18" y="T19"/>
+              </a:cxn>
+              <a:cxn ang="0">
+                <a:pos x="T20" y="T21"/>
+              </a:cxn>
+              <a:cxn ang="0">
+                <a:pos x="T22" y="T23"/>
+              </a:cxn>
+              <a:cxn ang="0">
+                <a:pos x="T24" y="T25"/>
+              </a:cxn>
+              <a:cxn ang="0">
+                <a:pos x="T26" y="T27"/>
+              </a:cxn>
+              <a:cxn ang="0">
+                <a:pos x="T28" y="T29"/>
+              </a:cxn>
+              <a:cxn ang="0">
+                <a:pos x="T30" y="T31"/>
+              </a:cxn>
+              <a:cxn ang="0">
+                <a:pos x="T32" y="T33"/>
+              </a:cxn>
+              <a:cxn ang="0">
+                <a:pos x="T34" y="T35"/>
+              </a:cxn>
+              <a:cxn ang="0">
+                <a:pos x="T36" y="T37"/>
+              </a:cxn>
+              <a:cxn ang="0">
+                <a:pos x="T38" y="T39"/>
+              </a:cxn>
+              <a:cxn ang="0">
+                <a:pos x="T40" y="T41"/>
+              </a:cxn>
+              <a:cxn ang="0">
+                <a:pos x="T42" y="T43"/>
+              </a:cxn>
+              <a:cxn ang="0">
+                <a:pos x="T44" y="T45"/>
+              </a:cxn>
+              <a:cxn ang="0">
+                <a:pos x="T46" y="T47"/>
+              </a:cxn>
+              <a:cxn ang="0">
+                <a:pos x="T48" y="T49"/>
+              </a:cxn>
+              <a:cxn ang="0">
+                <a:pos x="T50" y="T51"/>
+              </a:cxn>
+              <a:cxn ang="0">
+                <a:pos x="T52" y="T53"/>
+              </a:cxn>
+              <a:cxn ang="0">
+                <a:pos x="T54" y="T55"/>
+              </a:cxn>
+              <a:cxn ang="0">
+                <a:pos x="T56" y="T57"/>
+              </a:cxn>
+              <a:cxn ang="0">
+                <a:pos x="T58" y="T59"/>
+              </a:cxn>
+              <a:cxn ang="0">
+                <a:pos x="T60" y="T61"/>
+              </a:cxn>
+              <a:cxn ang="0">
+                <a:pos x="T62" y="T63"/>
+              </a:cxn>
+              <a:cxn ang="0">
+                <a:pos x="T64" y="T65"/>
+              </a:cxn>
+              <a:cxn ang="0">
+                <a:pos x="T66" y="T67"/>
+              </a:cxn>
+              <a:cxn ang="0">
+                <a:pos x="T68" y="T69"/>
+              </a:cxn>
+              <a:cxn ang="0">
+                <a:pos x="T70" y="T71"/>
+              </a:cxn>
+              <a:cxn ang="0">
+                <a:pos x="T72" y="T73"/>
+              </a:cxn>
+              <a:cxn ang="0">
+                <a:pos x="T74" y="T75"/>
+              </a:cxn>
+              <a:cxn ang="0">
+                <a:pos x="T76" y="T77"/>
+              </a:cxn>
+              <a:cxn ang="0">
+                <a:pos x="T78" y="T79"/>
+              </a:cxn>
+              <a:cxn ang="0">
+                <a:pos x="T80" y="T81"/>
+              </a:cxn>
+              <a:cxn ang="0">
+                <a:pos x="T82" y="T83"/>
+              </a:cxn>
+              <a:cxn ang="0">
+                <a:pos x="T84" y="T85"/>
+              </a:cxn>
+              <a:cxn ang="0">
+                <a:pos x="T86" y="T87"/>
+              </a:cxn>
+              <a:cxn ang="0">
+                <a:pos x="T88" y="T89"/>
+              </a:cxn>
+              <a:cxn ang="0">
+                <a:pos x="T90" y="T91"/>
+              </a:cxn>
+              <a:cxn ang="0">
+                <a:pos x="T92" y="T93"/>
+              </a:cxn>
+              <a:cxn ang="0">
+                <a:pos x="T94" y="T95"/>
+              </a:cxn>
+            </a:cxnLst>
+            <a:rect l="0" t="0" r="r" b="b"/>
+            <a:pathLst>
+              <a:path w="250" h="234">
+                <a:moveTo>
+                  <a:pt x="43" y="167"/>
+                </a:moveTo>
+                <a:cubicBezTo>
+                  <a:pt x="70" y="133"/>
+                  <a:pt x="70" y="133"/>
+                  <a:pt x="70" y="133"/>
+                </a:cubicBezTo>
+                <a:cubicBezTo>
+                  <a:pt x="60" y="134"/>
+                  <a:pt x="61" y="134"/>
+                  <a:pt x="48" y="134"/>
+                </a:cubicBezTo>
+                <a:cubicBezTo>
+                  <a:pt x="34" y="133"/>
+                  <a:pt x="24" y="132"/>
+                  <a:pt x="19" y="130"/>
+                </a:cubicBezTo>
+                <a:cubicBezTo>
+                  <a:pt x="13" y="128"/>
+                  <a:pt x="9" y="126"/>
+                  <a:pt x="6" y="123"/>
+                </a:cubicBezTo>
+                <a:cubicBezTo>
+                  <a:pt x="1" y="119"/>
+                  <a:pt x="0" y="112"/>
+                  <a:pt x="1" y="103"/>
+                </a:cubicBezTo>
+                <a:cubicBezTo>
+                  <a:pt x="2" y="93"/>
+                  <a:pt x="6" y="86"/>
+                  <a:pt x="11" y="81"/>
+                </a:cubicBezTo>
+                <a:cubicBezTo>
+                  <a:pt x="15" y="77"/>
+                  <a:pt x="18" y="76"/>
+                  <a:pt x="23" y="76"/>
+                </a:cubicBezTo>
+                <a:cubicBezTo>
+                  <a:pt x="81" y="78"/>
+                  <a:pt x="81" y="78"/>
+                  <a:pt x="81" y="78"/>
+                </a:cubicBezTo>
+                <a:cubicBezTo>
+                  <a:pt x="65" y="49"/>
+                  <a:pt x="65" y="49"/>
+                  <a:pt x="65" y="49"/>
+                </a:cubicBezTo>
+                <a:cubicBezTo>
+                  <a:pt x="58" y="40"/>
+                  <a:pt x="56" y="33"/>
+                  <a:pt x="57" y="27"/>
+                </a:cubicBezTo>
+                <a:cubicBezTo>
+                  <a:pt x="58" y="21"/>
+                  <a:pt x="62" y="16"/>
+                  <a:pt x="67" y="12"/>
+                </a:cubicBezTo>
+                <a:cubicBezTo>
+                  <a:pt x="74" y="6"/>
+                  <a:pt x="80" y="2"/>
+                  <a:pt x="85" y="1"/>
+                </a:cubicBezTo>
+                <a:cubicBezTo>
+                  <a:pt x="90" y="0"/>
+                  <a:pt x="95" y="2"/>
+                  <a:pt x="101" y="8"/>
+                </a:cubicBezTo>
+                <a:cubicBezTo>
+                  <a:pt x="104" y="11"/>
+                  <a:pt x="106" y="13"/>
+                  <a:pt x="107" y="15"/>
+                </a:cubicBezTo>
+                <a:cubicBezTo>
+                  <a:pt x="110" y="19"/>
+                  <a:pt x="112" y="20"/>
+                  <a:pt x="120" y="37"/>
+                </a:cubicBezTo>
+                <a:cubicBezTo>
+                  <a:pt x="129" y="55"/>
+                  <a:pt x="128" y="51"/>
+                  <a:pt x="131" y="60"/>
+                </a:cubicBezTo>
+                <a:cubicBezTo>
+                  <a:pt x="164" y="25"/>
+                  <a:pt x="164" y="25"/>
+                  <a:pt x="164" y="25"/>
+                </a:cubicBezTo>
+                <a:cubicBezTo>
+                  <a:pt x="173" y="16"/>
+                  <a:pt x="180" y="11"/>
+                  <a:pt x="187" y="11"/>
+                </a:cubicBezTo>
+                <a:cubicBezTo>
+                  <a:pt x="193" y="10"/>
+                  <a:pt x="200" y="13"/>
+                  <a:pt x="205" y="19"/>
+                </a:cubicBezTo>
+                <a:cubicBezTo>
+                  <a:pt x="210" y="24"/>
+                  <a:pt x="213" y="29"/>
+                  <a:pt x="214" y="34"/>
+                </a:cubicBezTo>
+                <a:cubicBezTo>
+                  <a:pt x="214" y="39"/>
+                  <a:pt x="211" y="47"/>
+                  <a:pt x="203" y="57"/>
+                </a:cubicBezTo>
+                <a:cubicBezTo>
+                  <a:pt x="166" y="100"/>
+                  <a:pt x="166" y="100"/>
+                  <a:pt x="166" y="100"/>
+                </a:cubicBezTo>
+                <a:cubicBezTo>
+                  <a:pt x="217" y="98"/>
+                  <a:pt x="217" y="98"/>
+                  <a:pt x="217" y="98"/>
+                </a:cubicBezTo>
+                <a:cubicBezTo>
+                  <a:pt x="229" y="96"/>
+                  <a:pt x="238" y="98"/>
+                  <a:pt x="244" y="104"/>
+                </a:cubicBezTo>
+                <a:cubicBezTo>
+                  <a:pt x="247" y="107"/>
+                  <a:pt x="249" y="111"/>
+                  <a:pt x="249" y="115"/>
+                </a:cubicBezTo>
+                <a:cubicBezTo>
+                  <a:pt x="250" y="120"/>
+                  <a:pt x="249" y="124"/>
+                  <a:pt x="247" y="129"/>
+                </a:cubicBezTo>
+                <a:cubicBezTo>
+                  <a:pt x="247" y="130"/>
+                  <a:pt x="246" y="132"/>
+                  <a:pt x="245" y="134"/>
+                </a:cubicBezTo>
+                <a:cubicBezTo>
+                  <a:pt x="244" y="137"/>
+                  <a:pt x="243" y="140"/>
+                  <a:pt x="241" y="141"/>
+                </a:cubicBezTo>
+                <a:cubicBezTo>
+                  <a:pt x="239" y="144"/>
+                  <a:pt x="234" y="146"/>
+                  <a:pt x="227" y="147"/>
+                </a:cubicBezTo>
+                <a:cubicBezTo>
+                  <a:pt x="221" y="149"/>
+                  <a:pt x="207" y="150"/>
+                  <a:pt x="187" y="151"/>
+                </a:cubicBezTo>
+                <a:cubicBezTo>
+                  <a:pt x="175" y="152"/>
+                  <a:pt x="161" y="148"/>
+                  <a:pt x="160" y="148"/>
+                </a:cubicBezTo>
+                <a:cubicBezTo>
+                  <a:pt x="161" y="151"/>
+                  <a:pt x="165" y="161"/>
+                  <a:pt x="168" y="168"/>
+                </a:cubicBezTo>
+                <a:cubicBezTo>
+                  <a:pt x="168" y="171"/>
+                  <a:pt x="173" y="181"/>
+                  <a:pt x="176" y="194"/>
+                </a:cubicBezTo>
+                <a:cubicBezTo>
+                  <a:pt x="179" y="206"/>
+                  <a:pt x="176" y="203"/>
+                  <a:pt x="176" y="211"/>
+                </a:cubicBezTo>
+                <a:cubicBezTo>
+                  <a:pt x="176" y="214"/>
+                  <a:pt x="174" y="217"/>
+                  <a:pt x="170" y="221"/>
+                </a:cubicBezTo>
+                <a:cubicBezTo>
+                  <a:pt x="166" y="226"/>
+                  <a:pt x="161" y="228"/>
+                  <a:pt x="156" y="230"/>
+                </a:cubicBezTo>
+                <a:cubicBezTo>
+                  <a:pt x="147" y="234"/>
+                  <a:pt x="137" y="233"/>
+                  <a:pt x="130" y="226"/>
+                </a:cubicBezTo>
+                <a:cubicBezTo>
+                  <a:pt x="127" y="223"/>
+                  <a:pt x="125" y="219"/>
+                  <a:pt x="122" y="213"/>
+                </a:cubicBezTo>
+                <a:cubicBezTo>
+                  <a:pt x="118" y="188"/>
+                  <a:pt x="117" y="189"/>
+                  <a:pt x="110" y="169"/>
+                </a:cubicBezTo>
+                <a:cubicBezTo>
+                  <a:pt x="92" y="192"/>
+                  <a:pt x="92" y="192"/>
+                  <a:pt x="92" y="192"/>
+                </a:cubicBezTo>
+                <a:cubicBezTo>
+                  <a:pt x="90" y="193"/>
+                  <a:pt x="88" y="195"/>
+                  <a:pt x="87" y="197"/>
+                </a:cubicBezTo>
+                <a:cubicBezTo>
+                  <a:pt x="86" y="198"/>
+                  <a:pt x="85" y="200"/>
+                  <a:pt x="84" y="201"/>
+                </a:cubicBezTo>
+                <a:cubicBezTo>
+                  <a:pt x="76" y="209"/>
+                  <a:pt x="70" y="212"/>
+                  <a:pt x="65" y="212"/>
+                </a:cubicBezTo>
+                <a:cubicBezTo>
+                  <a:pt x="60" y="211"/>
+                  <a:pt x="55" y="209"/>
+                  <a:pt x="50" y="204"/>
+                </a:cubicBezTo>
+                <a:cubicBezTo>
+                  <a:pt x="50" y="203"/>
+                  <a:pt x="48" y="202"/>
+                  <a:pt x="44" y="198"/>
+                </a:cubicBezTo>
+                <a:cubicBezTo>
+                  <a:pt x="41" y="195"/>
+                  <a:pt x="39" y="191"/>
+                  <a:pt x="38" y="185"/>
+                </a:cubicBezTo>
+                <a:cubicBezTo>
+                  <a:pt x="37" y="179"/>
+                  <a:pt x="39" y="173"/>
+                  <a:pt x="43" y="167"/>
+                </a:cubicBezTo>
+                <a:close/>
+              </a:path>
+            </a:pathLst>
+          </a:custGeom>
+          <a:solidFill>
+            <a:schemeClr val="accent4"/>
+          </a:solidFill>
+          <a:ln>
+            <a:noFill/>
+          </a:ln>
+        </p:spPr>
+        <p:txBody>
+          <a:bodyPr vert="horz" wrap="square" lIns="91440" tIns="45720" rIns="91440" bIns="45720" numCol="1" anchor="t" anchorCtr="0" compatLnSpc="1">
+            <a:prstTxWarp prst="textNoShape">
+              <a:avLst/>
+            </a:prstTxWarp>
+          </a:bodyPr>
+          <a:lstStyle/>
+          <a:p>
+            <a:endParaRPr lang="en-US"/>
+          </a:p>
+        </p:txBody>
+      </p:sp>
+    </p:spTree>
+    <p:extLst>
+      <p:ext uri="{BB962C8B-B14F-4D97-AF65-F5344CB8AC3E}">
+        <p14:creationId xmlns:p14="http://schemas.microsoft.com/office/powerpoint/2010/main" val="155682111"/>
       </p:ext>
     </p:extLst>
   </p:cSld>

</xml_diff>